<commit_message>
Redesign on the SQL Classes
</commit_message>
<xml_diff>
--- a/Data Literacy/01-intro to data - Final.pptx
+++ b/Data Literacy/01-intro to data - Final.pptx
@@ -383,7 +383,7 @@
               <a:pPr>
                 <a:defRPr/>
               </a:pPr>
-              <a:t>12/28/23</a:t>
+              <a:t>1/12/24</a:t>
             </a:fld>
             <a:endParaRPr lang="en-US" dirty="0"/>
           </a:p>
@@ -593,7 +593,7 @@
               <a:pPr>
                 <a:defRPr/>
               </a:pPr>
-              <a:t>12/28/23</a:t>
+              <a:t>1/12/24</a:t>
             </a:fld>
             <a:endParaRPr lang="en-US" dirty="0"/>
           </a:p>
@@ -14765,7 +14765,7 @@
           <a:p>
             <a:r>
               <a:rPr lang="en-US" dirty="0"/>
-              <a:t>Learning Objectives</a:t>
+              <a:t>Defining Data Literacy</a:t>
             </a:r>
           </a:p>
         </p:txBody>
@@ -18072,41 +18072,6 @@
         <p:txBody>
           <a:bodyPr/>
           <a:lstStyle/>
-          <a:p>
-            <a:r>
-              <a:rPr lang="en-US" b="0" i="0" dirty="0">
-                <a:solidFill>
-                  <a:srgbClr val="1C1917"/>
-                </a:solidFill>
-                <a:effectLst/>
-                <a:latin typeface="-apple-system"/>
-              </a:rPr>
-              <a:t>The ability to read, analyze, and make informed decisions using data effectively</a:t>
-            </a:r>
-          </a:p>
-          <a:p>
-            <a:pPr lvl="1"/>
-            <a:r>
-              <a:rPr lang="en-US" b="0" i="0" dirty="0">
-                <a:solidFill>
-                  <a:srgbClr val="1C1917"/>
-                </a:solidFill>
-                <a:effectLst/>
-                <a:latin typeface="-apple-system"/>
-              </a:rPr>
-              <a:t>Focuses on stressing the goal of making informed, fact-based decisions</a:t>
-            </a:r>
-          </a:p>
-          <a:p>
-            <a:pPr lvl="1"/>
-            <a:endParaRPr lang="en-US" b="0" i="0" dirty="0">
-              <a:solidFill>
-                <a:srgbClr val="1C1917"/>
-              </a:solidFill>
-              <a:effectLst/>
-              <a:latin typeface="-apple-system"/>
-            </a:endParaRPr>
-          </a:p>
           <a:p>
             <a:r>
               <a:rPr lang="en-US" b="0" i="0" dirty="0">
@@ -21840,12 +21805,21 @@
 </file>
 
 <file path=customXml/item1.xml><?xml version="1.0" encoding="utf-8"?>
+<?mso-contentType ?>
+<FormTemplates xmlns="http://schemas.microsoft.com/sharepoint/v3/contenttype/forms">
+  <Display>DocumentLibraryForm</Display>
+  <Edit>DocumentLibraryForm</Edit>
+  <New>DocumentLibraryForm</New>
+</FormTemplates>
+</file>
+
+<file path=customXml/item2.xml><?xml version="1.0" encoding="utf-8"?>
 <p:properties xmlns:p="http://schemas.microsoft.com/office/2006/metadata/properties" xmlns:xsi="http://www.w3.org/2001/XMLSchema-instance" xmlns:pc="http://schemas.microsoft.com/office/infopath/2007/PartnerControls">
   <documentManagement/>
 </p:properties>
 </file>
 
-<file path=customXml/item2.xml><?xml version="1.0" encoding="utf-8"?>
+<file path=customXml/item3.xml><?xml version="1.0" encoding="utf-8"?>
 <ct:contentTypeSchema xmlns:ct="http://schemas.microsoft.com/office/2006/metadata/contentType" xmlns:ma="http://schemas.microsoft.com/office/2006/metadata/properties/metaAttributes" ct:_="" ma:_="" ma:contentTypeName="Document" ma:contentTypeID="0x010100D717D047DAB2764FBE8B85865ADF125C" ma:contentTypeVersion="0" ma:contentTypeDescription="Create a new document." ma:contentTypeScope="" ma:versionID="3154522c01a2510568c44eaa3f86772f">
   <xsd:schema xmlns:xsd="http://www.w3.org/2001/XMLSchema" xmlns:xs="http://www.w3.org/2001/XMLSchema" xmlns:p="http://schemas.microsoft.com/office/2006/metadata/properties" targetNamespace="http://schemas.microsoft.com/office/2006/metadata/properties" ma:root="true" ma:fieldsID="1b05d82d297216baf5b26c55225140df">
     <xsd:element name="properties">
@@ -21959,16 +21933,15 @@
 </ct:contentTypeSchema>
 </file>
 
-<file path=customXml/item3.xml><?xml version="1.0" encoding="utf-8"?>
-<?mso-contentType ?>
-<FormTemplates xmlns="http://schemas.microsoft.com/sharepoint/v3/contenttype/forms">
-  <Display>DocumentLibraryForm</Display>
-  <Edit>DocumentLibraryForm</Edit>
-  <New>DocumentLibraryForm</New>
-</FormTemplates>
+<file path=customXml/itemProps1.xml><?xml version="1.0" encoding="utf-8"?>
+<ds:datastoreItem xmlns:ds="http://schemas.openxmlformats.org/officeDocument/2006/customXml" ds:itemID="{E49E43F2-009D-4FD5-9629-B1B9A3DF71DA}">
+  <ds:schemaRefs>
+    <ds:schemaRef ds:uri="http://schemas.microsoft.com/sharepoint/v3/contenttype/forms"/>
+  </ds:schemaRefs>
+</ds:datastoreItem>
 </file>
 
-<file path=customXml/itemProps1.xml><?xml version="1.0" encoding="utf-8"?>
+<file path=customXml/itemProps2.xml><?xml version="1.0" encoding="utf-8"?>
 <ds:datastoreItem xmlns:ds="http://schemas.openxmlformats.org/officeDocument/2006/customXml" ds:itemID="{C530F82F-BEB8-4CE5-BAAE-EC5C7B644B7C}">
   <ds:schemaRefs>
     <ds:schemaRef ds:uri="http://schemas.microsoft.com/office/2006/documentManagement/types"/>
@@ -21983,7 +21956,7 @@
 </ds:datastoreItem>
 </file>
 
-<file path=customXml/itemProps2.xml><?xml version="1.0" encoding="utf-8"?>
+<file path=customXml/itemProps3.xml><?xml version="1.0" encoding="utf-8"?>
 <ds:datastoreItem xmlns:ds="http://schemas.openxmlformats.org/officeDocument/2006/customXml" ds:itemID="{959784AE-7718-4684-9BBC-9AAC52D5A526}">
   <ds:schemaRefs>
     <ds:schemaRef ds:uri="http://schemas.microsoft.com/office/2006/metadata/contentType"/>
@@ -21997,12 +21970,4 @@
     <ds:schemaRef ds:uri="http://schemas.microsoft.com/office/infopath/2007/PartnerControls"/>
   </ds:schemaRefs>
 </ds:datastoreItem>
-</file>
-
-<file path=customXml/itemProps3.xml><?xml version="1.0" encoding="utf-8"?>
-<ds:datastoreItem xmlns:ds="http://schemas.openxmlformats.org/officeDocument/2006/customXml" ds:itemID="{E49E43F2-009D-4FD5-9629-B1B9A3DF71DA}">
-  <ds:schemaRefs>
-    <ds:schemaRef ds:uri="http://schemas.microsoft.com/sharepoint/v3/contenttype/forms"/>
-  </ds:schemaRefs>
-</ds:datastoreItem>
 </file>
</xml_diff>

<commit_message>
added markdown for data analytics in excel
</commit_message>
<xml_diff>
--- a/Data Literacy/01-intro to data - Final.pptx
+++ b/Data Literacy/01-intro to data - Final.pptx
@@ -383,7 +383,7 @@
               <a:pPr>
                 <a:defRPr/>
               </a:pPr>
-              <a:t>12/28/23</a:t>
+              <a:t>1/12/24</a:t>
             </a:fld>
             <a:endParaRPr lang="en-US" dirty="0"/>
           </a:p>
@@ -593,7 +593,7 @@
               <a:pPr>
                 <a:defRPr/>
               </a:pPr>
-              <a:t>12/28/23</a:t>
+              <a:t>1/12/24</a:t>
             </a:fld>
             <a:endParaRPr lang="en-US" dirty="0"/>
           </a:p>
@@ -14765,7 +14765,7 @@
           <a:p>
             <a:r>
               <a:rPr lang="en-US" dirty="0"/>
-              <a:t>Learning Objectives</a:t>
+              <a:t>Defining Data Literacy</a:t>
             </a:r>
           </a:p>
         </p:txBody>
@@ -18072,41 +18072,6 @@
         <p:txBody>
           <a:bodyPr/>
           <a:lstStyle/>
-          <a:p>
-            <a:r>
-              <a:rPr lang="en-US" b="0" i="0" dirty="0">
-                <a:solidFill>
-                  <a:srgbClr val="1C1917"/>
-                </a:solidFill>
-                <a:effectLst/>
-                <a:latin typeface="-apple-system"/>
-              </a:rPr>
-              <a:t>The ability to read, analyze, and make informed decisions using data effectively</a:t>
-            </a:r>
-          </a:p>
-          <a:p>
-            <a:pPr lvl="1"/>
-            <a:r>
-              <a:rPr lang="en-US" b="0" i="0" dirty="0">
-                <a:solidFill>
-                  <a:srgbClr val="1C1917"/>
-                </a:solidFill>
-                <a:effectLst/>
-                <a:latin typeface="-apple-system"/>
-              </a:rPr>
-              <a:t>Focuses on stressing the goal of making informed, fact-based decisions</a:t>
-            </a:r>
-          </a:p>
-          <a:p>
-            <a:pPr lvl="1"/>
-            <a:endParaRPr lang="en-US" b="0" i="0" dirty="0">
-              <a:solidFill>
-                <a:srgbClr val="1C1917"/>
-              </a:solidFill>
-              <a:effectLst/>
-              <a:latin typeface="-apple-system"/>
-            </a:endParaRPr>
-          </a:p>
           <a:p>
             <a:r>
               <a:rPr lang="en-US" b="0" i="0" dirty="0">
@@ -21840,12 +21805,21 @@
 </file>
 
 <file path=customXml/item1.xml><?xml version="1.0" encoding="utf-8"?>
+<?mso-contentType ?>
+<FormTemplates xmlns="http://schemas.microsoft.com/sharepoint/v3/contenttype/forms">
+  <Display>DocumentLibraryForm</Display>
+  <Edit>DocumentLibraryForm</Edit>
+  <New>DocumentLibraryForm</New>
+</FormTemplates>
+</file>
+
+<file path=customXml/item2.xml><?xml version="1.0" encoding="utf-8"?>
 <p:properties xmlns:p="http://schemas.microsoft.com/office/2006/metadata/properties" xmlns:xsi="http://www.w3.org/2001/XMLSchema-instance" xmlns:pc="http://schemas.microsoft.com/office/infopath/2007/PartnerControls">
   <documentManagement/>
 </p:properties>
 </file>
 
-<file path=customXml/item2.xml><?xml version="1.0" encoding="utf-8"?>
+<file path=customXml/item3.xml><?xml version="1.0" encoding="utf-8"?>
 <ct:contentTypeSchema xmlns:ct="http://schemas.microsoft.com/office/2006/metadata/contentType" xmlns:ma="http://schemas.microsoft.com/office/2006/metadata/properties/metaAttributes" ct:_="" ma:_="" ma:contentTypeName="Document" ma:contentTypeID="0x010100D717D047DAB2764FBE8B85865ADF125C" ma:contentTypeVersion="0" ma:contentTypeDescription="Create a new document." ma:contentTypeScope="" ma:versionID="3154522c01a2510568c44eaa3f86772f">
   <xsd:schema xmlns:xsd="http://www.w3.org/2001/XMLSchema" xmlns:xs="http://www.w3.org/2001/XMLSchema" xmlns:p="http://schemas.microsoft.com/office/2006/metadata/properties" targetNamespace="http://schemas.microsoft.com/office/2006/metadata/properties" ma:root="true" ma:fieldsID="1b05d82d297216baf5b26c55225140df">
     <xsd:element name="properties">
@@ -21959,16 +21933,15 @@
 </ct:contentTypeSchema>
 </file>
 
-<file path=customXml/item3.xml><?xml version="1.0" encoding="utf-8"?>
-<?mso-contentType ?>
-<FormTemplates xmlns="http://schemas.microsoft.com/sharepoint/v3/contenttype/forms">
-  <Display>DocumentLibraryForm</Display>
-  <Edit>DocumentLibraryForm</Edit>
-  <New>DocumentLibraryForm</New>
-</FormTemplates>
+<file path=customXml/itemProps1.xml><?xml version="1.0" encoding="utf-8"?>
+<ds:datastoreItem xmlns:ds="http://schemas.openxmlformats.org/officeDocument/2006/customXml" ds:itemID="{E49E43F2-009D-4FD5-9629-B1B9A3DF71DA}">
+  <ds:schemaRefs>
+    <ds:schemaRef ds:uri="http://schemas.microsoft.com/sharepoint/v3/contenttype/forms"/>
+  </ds:schemaRefs>
+</ds:datastoreItem>
 </file>
 
-<file path=customXml/itemProps1.xml><?xml version="1.0" encoding="utf-8"?>
+<file path=customXml/itemProps2.xml><?xml version="1.0" encoding="utf-8"?>
 <ds:datastoreItem xmlns:ds="http://schemas.openxmlformats.org/officeDocument/2006/customXml" ds:itemID="{C530F82F-BEB8-4CE5-BAAE-EC5C7B644B7C}">
   <ds:schemaRefs>
     <ds:schemaRef ds:uri="http://schemas.microsoft.com/office/2006/documentManagement/types"/>
@@ -21983,7 +21956,7 @@
 </ds:datastoreItem>
 </file>
 
-<file path=customXml/itemProps2.xml><?xml version="1.0" encoding="utf-8"?>
+<file path=customXml/itemProps3.xml><?xml version="1.0" encoding="utf-8"?>
 <ds:datastoreItem xmlns:ds="http://schemas.openxmlformats.org/officeDocument/2006/customXml" ds:itemID="{959784AE-7718-4684-9BBC-9AAC52D5A526}">
   <ds:schemaRefs>
     <ds:schemaRef ds:uri="http://schemas.microsoft.com/office/2006/metadata/contentType"/>
@@ -21997,12 +21970,4 @@
     <ds:schemaRef ds:uri="http://schemas.microsoft.com/office/infopath/2007/PartnerControls"/>
   </ds:schemaRefs>
 </ds:datastoreItem>
-</file>
-
-<file path=customXml/itemProps3.xml><?xml version="1.0" encoding="utf-8"?>
-<ds:datastoreItem xmlns:ds="http://schemas.openxmlformats.org/officeDocument/2006/customXml" ds:itemID="{E49E43F2-009D-4FD5-9629-B1B9A3DF71DA}">
-  <ds:schemaRefs>
-    <ds:schemaRef ds:uri="http://schemas.microsoft.com/sharepoint/v3/contenttype/forms"/>
-  </ds:schemaRefs>
-</ds:datastoreItem>
 </file>
</xml_diff>